<commit_message>
Login, Register klappt (Armin hat das gemacht)
</commit_message>
<xml_diff>
--- a/websitePPneu.pptx
+++ b/websitePPneu.pptx
@@ -6,7 +6,7 @@
     <p:sldMasterId id="2147483660" r:id="rId2"/>
   </p:sldMasterIdLst>
   <p:notesMasterIdLst>
-    <p:notesMasterId r:id="rId45"/>
+    <p:notesMasterId r:id="rId44"/>
   </p:notesMasterIdLst>
   <p:sldIdLst>
     <p:sldId id="269" r:id="rId3"/>
@@ -49,8 +49,7 @@
     <p:sldId id="308" r:id="rId40"/>
     <p:sldId id="309" r:id="rId41"/>
     <p:sldId id="324" r:id="rId42"/>
-    <p:sldId id="325" r:id="rId43"/>
-    <p:sldId id="326" r:id="rId44"/>
+    <p:sldId id="326" r:id="rId43"/>
   </p:sldIdLst>
   <p:sldSz cx="12192000" cy="6858000"/>
   <p:notesSz cx="6858000" cy="9144000"/>
@@ -1026,7 +1025,7 @@
           <a:p>
             <a:fld id="{14B763C8-2B43-4EF8-96C7-866FEE2CE356}" type="datetimeFigureOut">
               <a:rPr lang="de-DE" smtClean="0"/>
-              <a:t>05.06.2018</a:t>
+              <a:t>06.06.2018</a:t>
             </a:fld>
             <a:endParaRPr lang="de-DE"/>
           </a:p>
@@ -2160,7 +2159,7 @@
           <a:p>
             <a:fld id="{B93D8C30-FBE7-491E-9FDE-3062E4336643}" type="datetimeFigureOut">
               <a:rPr lang="de-DE" smtClean="0"/>
-              <a:t>05.06.2018</a:t>
+              <a:t>06.06.2018</a:t>
             </a:fld>
             <a:endParaRPr lang="de-DE"/>
           </a:p>
@@ -2358,7 +2357,7 @@
           <a:p>
             <a:fld id="{B93D8C30-FBE7-491E-9FDE-3062E4336643}" type="datetimeFigureOut">
               <a:rPr lang="de-DE" smtClean="0"/>
-              <a:t>05.06.2018</a:t>
+              <a:t>06.06.2018</a:t>
             </a:fld>
             <a:endParaRPr lang="de-DE"/>
           </a:p>
@@ -2566,7 +2565,7 @@
           <a:p>
             <a:fld id="{B93D8C30-FBE7-491E-9FDE-3062E4336643}" type="datetimeFigureOut">
               <a:rPr lang="de-DE" smtClean="0"/>
-              <a:t>05.06.2018</a:t>
+              <a:t>06.06.2018</a:t>
             </a:fld>
             <a:endParaRPr lang="de-DE"/>
           </a:p>
@@ -2800,7 +2799,7 @@
             <a:pPr rtl="0"/>
             <a:fld id="{248B4201-8B90-4FE4-B476-4FFDD434EB03}" type="datetime1">
               <a:rPr lang="de-DE" noProof="0" smtClean="0"/>
-              <a:t>05.06.2018</a:t>
+              <a:t>06.06.2018</a:t>
             </a:fld>
             <a:endParaRPr lang="de-DE" noProof="0" dirty="0"/>
           </a:p>
@@ -3001,7 +3000,7 @@
             <a:pPr rtl="0"/>
             <a:fld id="{517810AC-902E-4DEC-99E7-60A182C16A2C}" type="datetime1">
               <a:rPr lang="de-DE" noProof="0" smtClean="0"/>
-              <a:t>05.06.2018</a:t>
+              <a:t>06.06.2018</a:t>
             </a:fld>
             <a:endParaRPr lang="de-DE" noProof="0" dirty="0"/>
           </a:p>
@@ -3496,7 +3495,7 @@
             <a:pPr rtl="0"/>
             <a:fld id="{AAF596EA-2D4F-4E91-B75F-445352B00BF6}" type="datetime1">
               <a:rPr lang="de-DE" noProof="0" smtClean="0"/>
-              <a:t>05.06.2018</a:t>
+              <a:t>06.06.2018</a:t>
             </a:fld>
             <a:endParaRPr lang="de-DE" noProof="0" dirty="0"/>
           </a:p>
@@ -3939,7 +3938,7 @@
             <a:pPr rtl="0"/>
             <a:fld id="{043C7498-DE73-40BA-8259-7A61304B4A11}" type="datetime1">
               <a:rPr lang="de-DE" noProof="0" smtClean="0"/>
-              <a:t>05.06.2018</a:t>
+              <a:t>06.06.2018</a:t>
             </a:fld>
             <a:endParaRPr lang="de-DE" noProof="0" dirty="0"/>
           </a:p>
@@ -4076,7 +4075,7 @@
             <a:pPr rtl="0"/>
             <a:fld id="{D50BC0BE-60D6-475F-BA14-B2ADC57A2245}" type="datetime1">
               <a:rPr lang="de-DE" noProof="0" smtClean="0"/>
-              <a:t>05.06.2018</a:t>
+              <a:t>06.06.2018</a:t>
             </a:fld>
             <a:endParaRPr lang="de-DE" noProof="0" dirty="0"/>
           </a:p>
@@ -4189,7 +4188,7 @@
             <a:pPr rtl="0"/>
             <a:fld id="{A55A9D48-82C4-43D5-9652-C28047CA9FAA}" type="datetime1">
               <a:rPr lang="de-DE" noProof="0" smtClean="0"/>
-              <a:t>05.06.2018</a:t>
+              <a:t>06.06.2018</a:t>
             </a:fld>
             <a:endParaRPr lang="de-DE" noProof="0" dirty="0"/>
           </a:p>
@@ -4508,7 +4507,7 @@
             <a:pPr rtl="0"/>
             <a:fld id="{E63A1BB5-EA83-4F89-9699-AAA010E19188}" type="datetime1">
               <a:rPr lang="de-DE" noProof="0" smtClean="0"/>
-              <a:t>05.06.2018</a:t>
+              <a:t>06.06.2018</a:t>
             </a:fld>
             <a:endParaRPr lang="de-DE" noProof="0" dirty="0"/>
           </a:p>
@@ -4711,7 +4710,7 @@
           <a:p>
             <a:fld id="{B93D8C30-FBE7-491E-9FDE-3062E4336643}" type="datetimeFigureOut">
               <a:rPr lang="de-DE" smtClean="0"/>
-              <a:t>05.06.2018</a:t>
+              <a:t>06.06.2018</a:t>
             </a:fld>
             <a:endParaRPr lang="de-DE"/>
           </a:p>
@@ -5177,7 +5176,7 @@
             <a:pPr rtl="0"/>
             <a:fld id="{D1CFBF31-2E67-4300-8101-A0ED991CFD6C}" type="datetime1">
               <a:rPr lang="de-DE" noProof="0" smtClean="0"/>
-              <a:t>05.06.2018</a:t>
+              <a:t>06.06.2018</a:t>
             </a:fld>
             <a:endParaRPr lang="de-DE" noProof="0" dirty="0"/>
           </a:p>
@@ -5380,7 +5379,7 @@
             <a:pPr rtl="0"/>
             <a:fld id="{045F7D65-2C86-423A-B61F-8093B607745C}" type="datetime1">
               <a:rPr lang="de-DE" noProof="0" smtClean="0"/>
-              <a:t>05.06.2018</a:t>
+              <a:t>06.06.2018</a:t>
             </a:fld>
             <a:endParaRPr lang="de-DE" noProof="0" dirty="0"/>
           </a:p>
@@ -5660,7 +5659,7 @@
           <a:p>
             <a:fld id="{B93D8C30-FBE7-491E-9FDE-3062E4336643}" type="datetimeFigureOut">
               <a:rPr lang="de-DE" smtClean="0"/>
-              <a:t>05.06.2018</a:t>
+              <a:t>06.06.2018</a:t>
             </a:fld>
             <a:endParaRPr lang="de-DE"/>
           </a:p>
@@ -5925,7 +5924,7 @@
           <a:p>
             <a:fld id="{B93D8C30-FBE7-491E-9FDE-3062E4336643}" type="datetimeFigureOut">
               <a:rPr lang="de-DE" smtClean="0"/>
-              <a:t>05.06.2018</a:t>
+              <a:t>06.06.2018</a:t>
             </a:fld>
             <a:endParaRPr lang="de-DE"/>
           </a:p>
@@ -6337,7 +6336,7 @@
           <a:p>
             <a:fld id="{B93D8C30-FBE7-491E-9FDE-3062E4336643}" type="datetimeFigureOut">
               <a:rPr lang="de-DE" smtClean="0"/>
-              <a:t>05.06.2018</a:t>
+              <a:t>06.06.2018</a:t>
             </a:fld>
             <a:endParaRPr lang="de-DE"/>
           </a:p>
@@ -6478,7 +6477,7 @@
           <a:p>
             <a:fld id="{B93D8C30-FBE7-491E-9FDE-3062E4336643}" type="datetimeFigureOut">
               <a:rPr lang="de-DE" smtClean="0"/>
-              <a:t>05.06.2018</a:t>
+              <a:t>06.06.2018</a:t>
             </a:fld>
             <a:endParaRPr lang="de-DE"/>
           </a:p>
@@ -6591,7 +6590,7 @@
           <a:p>
             <a:fld id="{B93D8C30-FBE7-491E-9FDE-3062E4336643}" type="datetimeFigureOut">
               <a:rPr lang="de-DE" smtClean="0"/>
-              <a:t>05.06.2018</a:t>
+              <a:t>06.06.2018</a:t>
             </a:fld>
             <a:endParaRPr lang="de-DE"/>
           </a:p>
@@ -6902,7 +6901,7 @@
           <a:p>
             <a:fld id="{B93D8C30-FBE7-491E-9FDE-3062E4336643}" type="datetimeFigureOut">
               <a:rPr lang="de-DE" smtClean="0"/>
-              <a:t>05.06.2018</a:t>
+              <a:t>06.06.2018</a:t>
             </a:fld>
             <a:endParaRPr lang="de-DE"/>
           </a:p>
@@ -7190,7 +7189,7 @@
           <a:p>
             <a:fld id="{B93D8C30-FBE7-491E-9FDE-3062E4336643}" type="datetimeFigureOut">
               <a:rPr lang="de-DE" smtClean="0"/>
-              <a:t>05.06.2018</a:t>
+              <a:t>06.06.2018</a:t>
             </a:fld>
             <a:endParaRPr lang="de-DE"/>
           </a:p>
@@ -7431,7 +7430,7 @@
           <a:p>
             <a:fld id="{B93D8C30-FBE7-491E-9FDE-3062E4336643}" type="datetimeFigureOut">
               <a:rPr lang="de-DE" smtClean="0"/>
-              <a:t>05.06.2018</a:t>
+              <a:t>06.06.2018</a:t>
             </a:fld>
             <a:endParaRPr lang="de-DE"/>
           </a:p>
@@ -7993,7 +7992,7 @@
             <a:pPr rtl="0"/>
             <a:fld id="{4FD62CBB-C65F-4197-AAF7-F362E3DD9BD2}" type="datetime1">
               <a:rPr lang="de-DE" noProof="0" smtClean="0"/>
-              <a:t>05.06.2018</a:t>
+              <a:t>06.06.2018</a:t>
             </a:fld>
             <a:endParaRPr lang="de-DE" noProof="0" dirty="0"/>
           </a:p>
@@ -15938,257 +15937,6 @@
           <a:chExt cx="0" cy="0"/>
         </a:xfrm>
       </p:grpSpPr>
-      <p:pic>
-        <p:nvPicPr>
-          <p:cNvPr id="7" name="Grafik 6">
-            <a:extLst>
-              <a:ext uri="{FF2B5EF4-FFF2-40B4-BE49-F238E27FC236}">
-                <a16:creationId xmlns:a16="http://schemas.microsoft.com/office/drawing/2014/main" id="{D69E3AB2-FDF1-4CE2-9130-48554F747CE8}"/>
-              </a:ext>
-            </a:extLst>
-          </p:cNvPr>
-          <p:cNvPicPr>
-            <a:picLocks noChangeAspect="1"/>
-          </p:cNvPicPr>
-          <p:nvPr/>
-        </p:nvPicPr>
-        <p:blipFill>
-          <a:blip r:embed="rId2">
-            <a:extLst>
-              <a:ext uri="{28A0092B-C50C-407E-A947-70E740481C1C}">
-                <a14:useLocalDpi xmlns:a14="http://schemas.microsoft.com/office/drawing/2010/main" val="0"/>
-              </a:ext>
-            </a:extLst>
-          </a:blip>
-          <a:stretch>
-            <a:fillRect/>
-          </a:stretch>
-        </p:blipFill>
-        <p:spPr>
-          <a:xfrm>
-            <a:off x="-5202027" y="5962249"/>
-            <a:ext cx="17394027" cy="895751"/>
-          </a:xfrm>
-          <a:prstGeom prst="rect">
-            <a:avLst/>
-          </a:prstGeom>
-        </p:spPr>
-      </p:pic>
-      <p:sp>
-        <p:nvSpPr>
-          <p:cNvPr id="4" name="Titel 3">
-            <a:extLst>
-              <a:ext uri="{FF2B5EF4-FFF2-40B4-BE49-F238E27FC236}">
-                <a16:creationId xmlns:a16="http://schemas.microsoft.com/office/drawing/2014/main" id="{87AC8795-F72E-4F53-BACC-C551C2D8316A}"/>
-              </a:ext>
-            </a:extLst>
-          </p:cNvPr>
-          <p:cNvSpPr>
-            <a:spLocks noGrp="1"/>
-          </p:cNvSpPr>
-          <p:nvPr>
-            <p:ph type="title"/>
-          </p:nvPr>
-        </p:nvSpPr>
-        <p:spPr/>
-        <p:txBody>
-          <a:bodyPr/>
-          <a:lstStyle/>
-          <a:p>
-            <a:r>
-              <a:rPr lang="de-DE" dirty="0"/>
-              <a:t>Webservice-Schnittstelle</a:t>
-            </a:r>
-          </a:p>
-        </p:txBody>
-      </p:sp>
-      <p:sp>
-        <p:nvSpPr>
-          <p:cNvPr id="6" name="Inhaltsplatzhalter 5">
-            <a:extLst>
-              <a:ext uri="{FF2B5EF4-FFF2-40B4-BE49-F238E27FC236}">
-                <a16:creationId xmlns:a16="http://schemas.microsoft.com/office/drawing/2014/main" id="{37D42437-95F7-4C64-81D1-F82571A32530}"/>
-              </a:ext>
-            </a:extLst>
-          </p:cNvPr>
-          <p:cNvSpPr>
-            <a:spLocks noGrp="1"/>
-          </p:cNvSpPr>
-          <p:nvPr>
-            <p:ph idx="1"/>
-          </p:nvPr>
-        </p:nvSpPr>
-        <p:spPr/>
-        <p:txBody>
-          <a:bodyPr>
-            <a:normAutofit/>
-          </a:bodyPr>
-          <a:lstStyle/>
-          <a:p>
-            <a:pPr lvl="1"/>
-            <a:endParaRPr lang="de-DE" dirty="0"/>
-          </a:p>
-          <a:p>
-            <a:pPr lvl="1"/>
-            <a:r>
-              <a:rPr lang="de-DE" sz="2800" dirty="0" err="1"/>
-              <a:t>RESTful</a:t>
-            </a:r>
-            <a:r>
-              <a:rPr lang="de-DE" sz="2800" dirty="0"/>
-              <a:t> API mit MEAN</a:t>
-            </a:r>
-          </a:p>
-          <a:p>
-            <a:pPr lvl="2"/>
-            <a:r>
-              <a:rPr lang="de-DE" sz="2400" dirty="0"/>
-              <a:t>MongoDB</a:t>
-            </a:r>
-          </a:p>
-          <a:p>
-            <a:pPr lvl="2"/>
-            <a:r>
-              <a:rPr lang="de-DE" sz="2400" dirty="0"/>
-              <a:t>Express</a:t>
-            </a:r>
-          </a:p>
-          <a:p>
-            <a:pPr lvl="2"/>
-            <a:r>
-              <a:rPr lang="de-DE" sz="2400" dirty="0"/>
-              <a:t>AngularJS</a:t>
-            </a:r>
-          </a:p>
-          <a:p>
-            <a:pPr lvl="2"/>
-            <a:r>
-              <a:rPr lang="de-DE" sz="2400" dirty="0"/>
-              <a:t>Node.js</a:t>
-            </a:r>
-          </a:p>
-          <a:p>
-            <a:pPr lvl="2"/>
-            <a:endParaRPr lang="de-DE" sz="2400" dirty="0"/>
-          </a:p>
-          <a:p>
-            <a:pPr lvl="1"/>
-            <a:endParaRPr lang="de-DE" dirty="0"/>
-          </a:p>
-          <a:p>
-            <a:pPr marL="457200" lvl="1" indent="0">
-              <a:buNone/>
-            </a:pPr>
-            <a:endParaRPr lang="de-DE" dirty="0"/>
-          </a:p>
-          <a:p>
-            <a:pPr lvl="1"/>
-            <a:endParaRPr lang="de-DE" dirty="0"/>
-          </a:p>
-        </p:txBody>
-      </p:sp>
-      <p:pic>
-        <p:nvPicPr>
-          <p:cNvPr id="5" name="Grafik 4">
-            <a:extLst>
-              <a:ext uri="{FF2B5EF4-FFF2-40B4-BE49-F238E27FC236}">
-                <a16:creationId xmlns:a16="http://schemas.microsoft.com/office/drawing/2014/main" id="{B7E16C27-D378-4829-A890-B1E9782FCB2F}"/>
-              </a:ext>
-            </a:extLst>
-          </p:cNvPr>
-          <p:cNvPicPr>
-            <a:picLocks noChangeAspect="1"/>
-          </p:cNvPicPr>
-          <p:nvPr/>
-        </p:nvPicPr>
-        <p:blipFill>
-          <a:blip r:embed="rId3">
-            <a:extLst>
-              <a:ext uri="{28A0092B-C50C-407E-A947-70E740481C1C}">
-                <a14:useLocalDpi xmlns:a14="http://schemas.microsoft.com/office/drawing/2010/main" val="0"/>
-              </a:ext>
-            </a:extLst>
-          </a:blip>
-          <a:stretch>
-            <a:fillRect/>
-          </a:stretch>
-        </p:blipFill>
-        <p:spPr>
-          <a:xfrm>
-            <a:off x="0" y="0"/>
-            <a:ext cx="17967158" cy="533400"/>
-          </a:xfrm>
-          <a:prstGeom prst="rect">
-            <a:avLst/>
-          </a:prstGeom>
-        </p:spPr>
-      </p:pic>
-      <p:pic>
-        <p:nvPicPr>
-          <p:cNvPr id="13" name="Grafik 12">
-            <a:extLst>
-              <a:ext uri="{FF2B5EF4-FFF2-40B4-BE49-F238E27FC236}">
-                <a16:creationId xmlns:a16="http://schemas.microsoft.com/office/drawing/2014/main" id="{3F15EF38-607C-4029-BB9B-6A63B2AFF21A}"/>
-              </a:ext>
-            </a:extLst>
-          </p:cNvPr>
-          <p:cNvPicPr>
-            <a:picLocks noChangeAspect="1"/>
-          </p:cNvPicPr>
-          <p:nvPr/>
-        </p:nvPicPr>
-        <p:blipFill>
-          <a:blip r:embed="rId4">
-            <a:extLst>
-              <a:ext uri="{28A0092B-C50C-407E-A947-70E740481C1C}">
-                <a14:useLocalDpi xmlns:a14="http://schemas.microsoft.com/office/drawing/2010/main" val="0"/>
-              </a:ext>
-            </a:extLst>
-          </a:blip>
-          <a:stretch>
-            <a:fillRect/>
-          </a:stretch>
-        </p:blipFill>
-        <p:spPr>
-          <a:xfrm>
-            <a:off x="1247555" y="6410124"/>
-            <a:ext cx="4738488" cy="358976"/>
-          </a:xfrm>
-          <a:prstGeom prst="rect">
-            <a:avLst/>
-          </a:prstGeom>
-        </p:spPr>
-      </p:pic>
-    </p:spTree>
-    <p:extLst>
-      <p:ext uri="{BB962C8B-B14F-4D97-AF65-F5344CB8AC3E}">
-        <p14:creationId xmlns:p14="http://schemas.microsoft.com/office/powerpoint/2010/main" val="94707965"/>
-      </p:ext>
-    </p:extLst>
-  </p:cSld>
-  <p:clrMapOvr>
-    <a:masterClrMapping/>
-  </p:clrMapOvr>
-</p:sld>
-</file>
-
-<file path=ppt/slides/slide42.xml><?xml version="1.0" encoding="utf-8"?>
-<p:sld xmlns:a="http://schemas.openxmlformats.org/drawingml/2006/main" xmlns:r="http://schemas.openxmlformats.org/officeDocument/2006/relationships" xmlns:p="http://schemas.openxmlformats.org/presentationml/2006/main">
-  <p:cSld>
-    <p:spTree>
-      <p:nvGrpSpPr>
-        <p:cNvPr id="1" name=""/>
-        <p:cNvGrpSpPr/>
-        <p:nvPr/>
-      </p:nvGrpSpPr>
-      <p:grpSpPr>
-        <a:xfrm>
-          <a:off x="0" y="0"/>
-          <a:ext cx="0" cy="0"/>
-          <a:chOff x="0" y="0"/>
-          <a:chExt cx="0" cy="0"/>
-        </a:xfrm>
-      </p:grpSpPr>
       <p:sp>
         <p:nvSpPr>
           <p:cNvPr id="2" name="Titel 1">
@@ -16554,7 +16302,7 @@
             <a:pPr lvl="1"/>
             <a:r>
               <a:rPr lang="de-DE" dirty="0"/>
-              <a:t>Altes Logo wurde als „irgendwie hässlich“ empfunden</a:t>
+              <a:t>Altes Logo wurde als unpassend empfunden</a:t>
             </a:r>
           </a:p>
           <a:p>

</xml_diff>